<commit_message>
Changed color for analysis visualizations
</commit_message>
<xml_diff>
--- a/final_deliverable/poster/Poster.pptx
+++ b/final_deliverable/poster/Poster.pptx
@@ -1,6 +1,6 @@
 
 <file path=ppt/presentation.xml><?xml version="1.0" encoding="utf-8"?>
-<p:presentation xmlns:a="http://schemas.openxmlformats.org/drawingml/2006/main" xmlns:r="http://schemas.openxmlformats.org/officeDocument/2006/relationships" xmlns:p="http://schemas.openxmlformats.org/presentationml/2006/main" saveSubsetFonts="1">
+<p:presentation xmlns:a="http://schemas.openxmlformats.org/drawingml/2006/main" xmlns:r="http://schemas.openxmlformats.org/officeDocument/2006/relationships" xmlns:p="http://schemas.openxmlformats.org/presentationml/2006/main" saveSubsetFonts="1" autoCompressPictures="0">
   <p:sldMasterIdLst>
     <p:sldMasterId id="2147483660" r:id="rId1"/>
   </p:sldMasterIdLst>
@@ -254,7 +254,7 @@
           <a:p>
             <a:fld id="{FF9CF86C-9498-4717-8AB5-811567CBC580}" type="datetimeFigureOut">
               <a:rPr lang="en-SG" smtClean="0"/>
-              <a:t>7/4/2021</a:t>
+              <a:t>9/4/2021</a:t>
             </a:fld>
             <a:endParaRPr lang="en-SG"/>
           </a:p>
@@ -424,7 +424,7 @@
           <a:p>
             <a:fld id="{FF9CF86C-9498-4717-8AB5-811567CBC580}" type="datetimeFigureOut">
               <a:rPr lang="en-SG" smtClean="0"/>
-              <a:t>7/4/2021</a:t>
+              <a:t>9/4/2021</a:t>
             </a:fld>
             <a:endParaRPr lang="en-SG"/>
           </a:p>
@@ -604,7 +604,7 @@
           <a:p>
             <a:fld id="{FF9CF86C-9498-4717-8AB5-811567CBC580}" type="datetimeFigureOut">
               <a:rPr lang="en-SG" smtClean="0"/>
-              <a:t>7/4/2021</a:t>
+              <a:t>9/4/2021</a:t>
             </a:fld>
             <a:endParaRPr lang="en-SG"/>
           </a:p>
@@ -774,7 +774,7 @@
           <a:p>
             <a:fld id="{FF9CF86C-9498-4717-8AB5-811567CBC580}" type="datetimeFigureOut">
               <a:rPr lang="en-SG" smtClean="0"/>
-              <a:t>7/4/2021</a:t>
+              <a:t>9/4/2021</a:t>
             </a:fld>
             <a:endParaRPr lang="en-SG"/>
           </a:p>
@@ -1018,7 +1018,7 @@
           <a:p>
             <a:fld id="{FF9CF86C-9498-4717-8AB5-811567CBC580}" type="datetimeFigureOut">
               <a:rPr lang="en-SG" smtClean="0"/>
-              <a:t>7/4/2021</a:t>
+              <a:t>9/4/2021</a:t>
             </a:fld>
             <a:endParaRPr lang="en-SG"/>
           </a:p>
@@ -1250,7 +1250,7 @@
           <a:p>
             <a:fld id="{FF9CF86C-9498-4717-8AB5-811567CBC580}" type="datetimeFigureOut">
               <a:rPr lang="en-SG" smtClean="0"/>
-              <a:t>7/4/2021</a:t>
+              <a:t>9/4/2021</a:t>
             </a:fld>
             <a:endParaRPr lang="en-SG"/>
           </a:p>
@@ -1617,7 +1617,7 @@
           <a:p>
             <a:fld id="{FF9CF86C-9498-4717-8AB5-811567CBC580}" type="datetimeFigureOut">
               <a:rPr lang="en-SG" smtClean="0"/>
-              <a:t>7/4/2021</a:t>
+              <a:t>9/4/2021</a:t>
             </a:fld>
             <a:endParaRPr lang="en-SG"/>
           </a:p>
@@ -1735,7 +1735,7 @@
           <a:p>
             <a:fld id="{FF9CF86C-9498-4717-8AB5-811567CBC580}" type="datetimeFigureOut">
               <a:rPr lang="en-SG" smtClean="0"/>
-              <a:t>7/4/2021</a:t>
+              <a:t>9/4/2021</a:t>
             </a:fld>
             <a:endParaRPr lang="en-SG"/>
           </a:p>
@@ -1830,7 +1830,7 @@
           <a:p>
             <a:fld id="{FF9CF86C-9498-4717-8AB5-811567CBC580}" type="datetimeFigureOut">
               <a:rPr lang="en-SG" smtClean="0"/>
-              <a:t>7/4/2021</a:t>
+              <a:t>9/4/2021</a:t>
             </a:fld>
             <a:endParaRPr lang="en-SG"/>
           </a:p>
@@ -2107,7 +2107,7 @@
           <a:p>
             <a:fld id="{FF9CF86C-9498-4717-8AB5-811567CBC580}" type="datetimeFigureOut">
               <a:rPr lang="en-SG" smtClean="0"/>
-              <a:t>7/4/2021</a:t>
+              <a:t>9/4/2021</a:t>
             </a:fld>
             <a:endParaRPr lang="en-SG"/>
           </a:p>
@@ -2364,7 +2364,7 @@
           <a:p>
             <a:fld id="{FF9CF86C-9498-4717-8AB5-811567CBC580}" type="datetimeFigureOut">
               <a:rPr lang="en-SG" smtClean="0"/>
-              <a:t>7/4/2021</a:t>
+              <a:t>9/4/2021</a:t>
             </a:fld>
             <a:endParaRPr lang="en-SG"/>
           </a:p>
@@ -2586,7 +2586,7 @@
           <a:p>
             <a:fld id="{FF9CF86C-9498-4717-8AB5-811567CBC580}" type="datetimeFigureOut">
               <a:rPr lang="en-SG" smtClean="0"/>
-              <a:t>7/4/2021</a:t>
+              <a:t>9/4/2021</a:t>
             </a:fld>
             <a:endParaRPr lang="en-SG"/>
           </a:p>
@@ -2981,23 +2981,12 @@
       <p:bgPr>
         <a:blipFill dpi="0" rotWithShape="1">
           <a:blip r:embed="rId2">
-            <a:alphaModFix amt="85000"/>
+            <a:alphaModFix amt="95000"/>
             <a:lum/>
-            <a:extLst>
-              <a:ext uri="{BEBA8EAE-BF5A-486C-A8C5-ECC9F3942E4B}">
-                <a14:imgProps xmlns:a14="http://schemas.microsoft.com/office/drawing/2010/main">
-                  <a14:imgLayer r:embed="rId3">
-                    <a14:imgEffect>
-                      <a14:colorTemperature colorTemp="6000"/>
-                    </a14:imgEffect>
-                  </a14:imgLayer>
-                </a14:imgProps>
-              </a:ext>
-            </a:extLst>
           </a:blip>
           <a:srcRect/>
           <a:stretch>
-            <a:fillRect l="-31000" r="-31000"/>
+            <a:fillRect l="-17000" r="-17000"/>
           </a:stretch>
         </a:blipFill>
         <a:effectLst/>
@@ -3019,6 +3008,64 @@
       </p:grpSpPr>
       <p:sp>
         <p:nvSpPr>
+          <p:cNvPr id="11" name="Rectangle 10">
+            <a:extLst>
+              <a:ext uri="{FF2B5EF4-FFF2-40B4-BE49-F238E27FC236}">
+                <a16:creationId xmlns:a16="http://schemas.microsoft.com/office/drawing/2014/main" id="{0EB5E6C3-B863-487C-B3DF-F9AEBEC49AD3}"/>
+              </a:ext>
+            </a:extLst>
+          </p:cNvPr>
+          <p:cNvSpPr/>
+          <p:nvPr/>
+        </p:nvSpPr>
+        <p:spPr>
+          <a:xfrm>
+            <a:off x="0" y="383906"/>
+            <a:ext cx="38404800" cy="4983224"/>
+          </a:xfrm>
+          <a:prstGeom prst="rect">
+            <a:avLst/>
+          </a:prstGeom>
+          <a:solidFill>
+            <a:srgbClr val="7C283E">
+              <a:alpha val="80000"/>
+            </a:srgbClr>
+          </a:solidFill>
+          <a:effectLst>
+            <a:outerShdw blurRad="50800" dist="38100" dir="2700000" algn="tl" rotWithShape="0">
+              <a:prstClr val="black">
+                <a:alpha val="40000"/>
+              </a:prstClr>
+            </a:outerShdw>
+          </a:effectLst>
+        </p:spPr>
+        <p:style>
+          <a:lnRef idx="2">
+            <a:schemeClr val="accent1">
+              <a:shade val="50000"/>
+            </a:schemeClr>
+          </a:lnRef>
+          <a:fillRef idx="1">
+            <a:schemeClr val="accent1"/>
+          </a:fillRef>
+          <a:effectRef idx="0">
+            <a:schemeClr val="accent1"/>
+          </a:effectRef>
+          <a:fontRef idx="minor">
+            <a:schemeClr val="lt1"/>
+          </a:fontRef>
+        </p:style>
+        <p:txBody>
+          <a:bodyPr rtlCol="0" anchor="ctr"/>
+          <a:lstStyle/>
+          <a:p>
+            <a:pPr algn="ctr"/>
+            <a:endParaRPr lang="en-US" sz="8000" b="1" dirty="0"/>
+          </a:p>
+        </p:txBody>
+      </p:sp>
+      <p:sp>
+        <p:nvSpPr>
           <p:cNvPr id="4" name="TextBox 3">
             <a:extLst>
               <a:ext uri="{FF2B5EF4-FFF2-40B4-BE49-F238E27FC236}">
@@ -3031,7 +3078,7 @@
         </p:nvSpPr>
         <p:spPr>
           <a:xfrm>
-            <a:off x="1292087" y="778625"/>
+            <a:off x="1292087" y="622189"/>
             <a:ext cx="35820626" cy="4462760"/>
           </a:xfrm>
           <a:prstGeom prst="rect">
@@ -3069,8 +3116,45 @@
                 <a:solidFill>
                   <a:schemeClr val="bg1"/>
                 </a:solidFill>
-              </a:rPr>
-              <a:t>An analysis of the impacts of air travel on the spread of COVID-19 </a:t>
+                <a:effectLst>
+                  <a:outerShdw blurRad="38100" dist="38100" dir="2700000" algn="tl">
+                    <a:srgbClr val="000000">
+                      <a:alpha val="43137"/>
+                    </a:srgbClr>
+                  </a:outerShdw>
+                </a:effectLst>
+              </a:rPr>
+              <a:t>An analysis of the impacts of air travel on </a:t>
+            </a:r>
+            <a:r>
+              <a:rPr lang="en-US" sz="8000" dirty="0">
+                <a:solidFill>
+                  <a:schemeClr val="bg1"/>
+                </a:solidFill>
+                <a:effectLst>
+                  <a:outerShdw blurRad="50800" dist="38100" dir="2700000" algn="tl" rotWithShape="0">
+                    <a:prstClr val="black">
+                      <a:alpha val="40000"/>
+                    </a:prstClr>
+                  </a:outerShdw>
+                </a:effectLst>
+              </a:rPr>
+              <a:t>the</a:t>
+            </a:r>
+            <a:r>
+              <a:rPr lang="en-US" sz="8000" dirty="0">
+                <a:solidFill>
+                  <a:schemeClr val="bg1"/>
+                </a:solidFill>
+                <a:effectLst>
+                  <a:outerShdw blurRad="38100" dist="38100" dir="2700000" algn="tl">
+                    <a:srgbClr val="000000">
+                      <a:alpha val="43137"/>
+                    </a:srgbClr>
+                  </a:outerShdw>
+                </a:effectLst>
+              </a:rPr>
+              <a:t> spread of COVID-19 </a:t>
             </a:r>
           </a:p>
           <a:p>
@@ -3080,6 +3164,13 @@
                 <a:solidFill>
                   <a:schemeClr val="bg1"/>
                 </a:solidFill>
+                <a:effectLst>
+                  <a:outerShdw blurRad="38100" dist="38100" dir="2700000" algn="tl">
+                    <a:srgbClr val="000000">
+                      <a:alpha val="43137"/>
+                    </a:srgbClr>
+                  </a:outerShdw>
+                </a:effectLst>
               </a:rPr>
               <a:t>Jian Cong Loh, Joshua Neronha, Stephen Sun, Tzuhwan Seet</a:t>
             </a:r>
@@ -3087,6 +3178,13 @@
               <a:solidFill>
                 <a:schemeClr val="bg1"/>
               </a:solidFill>
+              <a:effectLst>
+                <a:outerShdw blurRad="38100" dist="38100" dir="2700000" algn="tl">
+                  <a:srgbClr val="000000">
+                    <a:alpha val="43137"/>
+                  </a:srgbClr>
+                </a:outerShdw>
+              </a:effectLst>
             </a:endParaRPr>
           </a:p>
         </p:txBody>
@@ -3105,7 +3203,7 @@
         </p:nvSpPr>
         <p:spPr>
           <a:xfrm>
-            <a:off x="775251" y="5875135"/>
+            <a:off x="894521" y="6713984"/>
             <a:ext cx="11191461" cy="5336678"/>
           </a:xfrm>
           <a:prstGeom prst="rect">
@@ -3163,7 +3261,7 @@
         </p:nvSpPr>
         <p:spPr>
           <a:xfrm>
-            <a:off x="1411355" y="7564162"/>
+            <a:off x="1530625" y="8403011"/>
             <a:ext cx="9919252" cy="3170099"/>
           </a:xfrm>
           <a:prstGeom prst="rect">
@@ -3512,7 +3610,7 @@
         </p:nvSpPr>
         <p:spPr>
           <a:xfrm>
-            <a:off x="3915823" y="6057929"/>
+            <a:off x="4035091" y="6826708"/>
             <a:ext cx="4910319" cy="1323439"/>
           </a:xfrm>
           <a:prstGeom prst="rect">
@@ -3557,11 +3655,11 @@
           <p:nvPr/>
         </p:nvPicPr>
         <p:blipFill>
-          <a:blip r:embed="rId4">
+          <a:blip r:embed="rId3">
             <a:extLst>
               <a:ext uri="{BEBA8EAE-BF5A-486C-A8C5-ECC9F3942E4B}">
                 <a14:imgProps xmlns:a14="http://schemas.microsoft.com/office/drawing/2010/main">
-                  <a14:imgLayer r:embed="rId5">
+                  <a14:imgLayer r:embed="rId4">
                     <a14:imgEffect>
                       <a14:colorTemperature colorTemp="1500"/>
                     </a14:imgEffect>
@@ -3610,11 +3708,11 @@
           <p:nvPr/>
         </p:nvPicPr>
         <p:blipFill>
-          <a:blip r:embed="rId6">
+          <a:blip r:embed="rId5">
             <a:extLst>
               <a:ext uri="{BEBA8EAE-BF5A-486C-A8C5-ECC9F3942E4B}">
                 <a14:imgProps xmlns:a14="http://schemas.microsoft.com/office/drawing/2010/main">
-                  <a14:imgLayer r:embed="rId7">
+                  <a14:imgLayer r:embed="rId6">
                     <a14:imgEffect>
                       <a14:colorTemperature colorTemp="1500"/>
                     </a14:imgEffect>
@@ -3657,6 +3755,122 @@
           </a:extLst>
         </p:spPr>
       </p:pic>
+      <p:sp>
+        <p:nvSpPr>
+          <p:cNvPr id="10" name="Rectangle 9">
+            <a:extLst>
+              <a:ext uri="{FF2B5EF4-FFF2-40B4-BE49-F238E27FC236}">
+                <a16:creationId xmlns:a16="http://schemas.microsoft.com/office/drawing/2014/main" id="{C7922F35-5C78-4CD0-90F7-1141527BAC52}"/>
+              </a:ext>
+            </a:extLst>
+          </p:cNvPr>
+          <p:cNvSpPr/>
+          <p:nvPr/>
+        </p:nvSpPr>
+        <p:spPr>
+          <a:xfrm>
+            <a:off x="13606669" y="6826707"/>
+            <a:ext cx="11191461" cy="12415449"/>
+          </a:xfrm>
+          <a:prstGeom prst="rect">
+            <a:avLst/>
+          </a:prstGeom>
+          <a:solidFill>
+            <a:srgbClr val="7C283E">
+              <a:alpha val="80000"/>
+            </a:srgbClr>
+          </a:solidFill>
+          <a:effectLst>
+            <a:outerShdw blurRad="50800" dist="38100" dir="2700000" algn="tl" rotWithShape="0">
+              <a:prstClr val="black">
+                <a:alpha val="40000"/>
+              </a:prstClr>
+            </a:outerShdw>
+          </a:effectLst>
+        </p:spPr>
+        <p:style>
+          <a:lnRef idx="2">
+            <a:schemeClr val="accent1">
+              <a:shade val="50000"/>
+            </a:schemeClr>
+          </a:lnRef>
+          <a:fillRef idx="1">
+            <a:schemeClr val="accent1"/>
+          </a:fillRef>
+          <a:effectRef idx="0">
+            <a:schemeClr val="accent1"/>
+          </a:effectRef>
+          <a:fontRef idx="minor">
+            <a:schemeClr val="lt1"/>
+          </a:fontRef>
+        </p:style>
+        <p:txBody>
+          <a:bodyPr rtlCol="0" anchor="ctr"/>
+          <a:lstStyle/>
+          <a:p>
+            <a:pPr algn="ctr"/>
+            <a:endParaRPr lang="en-US" sz="8000" b="1" dirty="0"/>
+          </a:p>
+        </p:txBody>
+      </p:sp>
+      <p:sp>
+        <p:nvSpPr>
+          <p:cNvPr id="12" name="Rectangle 11">
+            <a:extLst>
+              <a:ext uri="{FF2B5EF4-FFF2-40B4-BE49-F238E27FC236}">
+                <a16:creationId xmlns:a16="http://schemas.microsoft.com/office/drawing/2014/main" id="{2DF93F0E-4A44-40F7-BB4A-D3551DBAC35E}"/>
+              </a:ext>
+            </a:extLst>
+          </p:cNvPr>
+          <p:cNvSpPr/>
+          <p:nvPr/>
+        </p:nvSpPr>
+        <p:spPr>
+          <a:xfrm>
+            <a:off x="26318817" y="6713984"/>
+            <a:ext cx="11191461" cy="5336678"/>
+          </a:xfrm>
+          <a:prstGeom prst="rect">
+            <a:avLst/>
+          </a:prstGeom>
+          <a:solidFill>
+            <a:srgbClr val="7C283E">
+              <a:alpha val="80000"/>
+            </a:srgbClr>
+          </a:solidFill>
+          <a:effectLst>
+            <a:outerShdw blurRad="50800" dist="38100" dir="2700000" algn="tl" rotWithShape="0">
+              <a:prstClr val="black">
+                <a:alpha val="40000"/>
+              </a:prstClr>
+            </a:outerShdw>
+          </a:effectLst>
+        </p:spPr>
+        <p:style>
+          <a:lnRef idx="2">
+            <a:schemeClr val="accent1">
+              <a:shade val="50000"/>
+            </a:schemeClr>
+          </a:lnRef>
+          <a:fillRef idx="1">
+            <a:schemeClr val="accent1"/>
+          </a:fillRef>
+          <a:effectRef idx="0">
+            <a:schemeClr val="accent1"/>
+          </a:effectRef>
+          <a:fontRef idx="minor">
+            <a:schemeClr val="lt1"/>
+          </a:fontRef>
+        </p:style>
+        <p:txBody>
+          <a:bodyPr rtlCol="0" anchor="ctr"/>
+          <a:lstStyle/>
+          <a:p>
+            <a:pPr algn="ctr"/>
+            <a:endParaRPr lang="en-US" sz="8000" b="1" dirty="0"/>
+          </a:p>
+        </p:txBody>
+      </p:sp>
     </p:spTree>
     <p:extLst>
       <p:ext uri="{BB962C8B-B14F-4D97-AF65-F5344CB8AC3E}">

</xml_diff>

<commit_message>
Updated poster (1st col done)
</commit_message>
<xml_diff>
--- a/final_deliverable/poster/Poster.pptx
+++ b/final_deliverable/poster/Poster.pptx
@@ -3440,8 +3440,8 @@
         </p:nvSpPr>
         <p:spPr>
           <a:xfrm>
-            <a:off x="685186" y="6597945"/>
-            <a:ext cx="10387851" cy="8002191"/>
+            <a:off x="676586" y="6369345"/>
+            <a:ext cx="10387851" cy="7571303"/>
           </a:xfrm>
           <a:prstGeom prst="rect">
             <a:avLst/>
@@ -3589,7 +3589,7 @@
                 <a:ea typeface="Open Sans" panose="020B0606030504020204" pitchFamily="34" charset="0"/>
                 <a:cs typeface="Open Sans" panose="020B0606030504020204" pitchFamily="34" charset="0"/>
               </a:rPr>
-              <a:t> gives a 10% sample of all flight itineraries by quarter, and covers the first three quarters of 2020. The </a:t>
+              <a:t> gives a 10% sample of all itineraries by quarter, and covers Q1 to Q3 2020. The </a:t>
             </a:r>
             <a:r>
               <a:rPr lang="en-US" sz="2800" b="1" dirty="0">
@@ -3845,7 +3845,7 @@
         </p:nvSpPr>
         <p:spPr>
           <a:xfrm>
-            <a:off x="4073168" y="2991552"/>
+            <a:off x="4064568" y="2991552"/>
             <a:ext cx="3611886" cy="830997"/>
           </a:xfrm>
           <a:prstGeom prst="rect">
@@ -3859,6 +3859,7 @@
           </a:bodyPr>
           <a:lstStyle/>
           <a:p>
+            <a:pPr algn="ctr"/>
             <a:r>
               <a:rPr lang="en-US" sz="4800" b="1" dirty="0">
                 <a:solidFill>
@@ -4010,7 +4011,7 @@
         </p:nvSpPr>
         <p:spPr>
           <a:xfrm>
-            <a:off x="4789037" y="5741310"/>
+            <a:off x="4780437" y="5544891"/>
             <a:ext cx="2180149" cy="830997"/>
           </a:xfrm>
           <a:prstGeom prst="rect">
@@ -4024,6 +4025,7 @@
           </a:bodyPr>
           <a:lstStyle/>
           <a:p>
+            <a:pPr algn="ctr"/>
             <a:r>
               <a:rPr lang="en-US" sz="4800" b="1" dirty="0">
                 <a:solidFill>
@@ -4060,7 +4062,7 @@
         </p:nvSpPr>
         <p:spPr>
           <a:xfrm>
-            <a:off x="3769399" y="14877794"/>
+            <a:off x="3760799" y="14095322"/>
             <a:ext cx="4219425" cy="830997"/>
           </a:xfrm>
           <a:prstGeom prst="rect">
@@ -4074,6 +4076,7 @@
           </a:bodyPr>
           <a:lstStyle/>
           <a:p>
+            <a:pPr algn="ctr"/>
             <a:r>
               <a:rPr lang="en-US" sz="4800" b="1" dirty="0">
                 <a:solidFill>
@@ -4110,7 +4113,7 @@
         </p:nvSpPr>
         <p:spPr>
           <a:xfrm>
-            <a:off x="14301860" y="2991552"/>
+            <a:off x="15262860" y="2991552"/>
             <a:ext cx="7879080" cy="830997"/>
           </a:xfrm>
           <a:prstGeom prst="rect">
@@ -4160,7 +4163,7 @@
         </p:nvSpPr>
         <p:spPr>
           <a:xfrm>
-            <a:off x="14768334" y="13081946"/>
+            <a:off x="15635558" y="13081946"/>
             <a:ext cx="7133684" cy="830997"/>
           </a:xfrm>
           <a:prstGeom prst="rect">
@@ -4253,7 +4256,7 @@
         </p:nvSpPr>
         <p:spPr>
           <a:xfrm>
-            <a:off x="685185" y="3970397"/>
+            <a:off x="676585" y="3970397"/>
             <a:ext cx="10387853" cy="1384995"/>
           </a:xfrm>
           <a:prstGeom prst="rect">
@@ -4277,7 +4280,7 @@
                 <a:ea typeface="Open Sans" panose="020B0606030504020204" pitchFamily="34" charset="0"/>
                 <a:cs typeface="Open Sans" panose="020B0606030504020204" pitchFamily="34" charset="0"/>
               </a:rPr>
-              <a:t>We hypothesize that a greater number of air passenger arrivals in a US state is positively correlated with a greater number of COVID-19 cases.</a:t>
+              <a:t>We hypothesize that the number of air passenger arrivals in a US state is positively correlated with the number of COVID-19 cases.</a:t>
             </a:r>
             <a:endParaRPr lang="en-SG" sz="2800" b="1" dirty="0">
               <a:solidFill>
@@ -4304,7 +4307,7 @@
         </p:nvSpPr>
         <p:spPr>
           <a:xfrm>
-            <a:off x="13991679" y="18301316"/>
+            <a:off x="15015196" y="18301316"/>
             <a:ext cx="8374408" cy="830997"/>
           </a:xfrm>
           <a:prstGeom prst="rect">
@@ -4354,7 +4357,7 @@
         </p:nvSpPr>
         <p:spPr>
           <a:xfrm>
-            <a:off x="15400719" y="22568452"/>
+            <a:off x="16142909" y="22568452"/>
             <a:ext cx="6118983" cy="830997"/>
           </a:xfrm>
           <a:prstGeom prst="rect">
@@ -4404,7 +4407,7 @@
         </p:nvSpPr>
         <p:spPr>
           <a:xfrm>
-            <a:off x="29039366" y="2991552"/>
+            <a:off x="29720642" y="2991552"/>
             <a:ext cx="5644494" cy="830997"/>
           </a:xfrm>
           <a:prstGeom prst="rect">
@@ -4527,7 +4530,7 @@
         </p:nvSpPr>
         <p:spPr>
           <a:xfrm>
-            <a:off x="30156659" y="12511338"/>
+            <a:off x="30615118" y="12511338"/>
             <a:ext cx="3855543" cy="830997"/>
           </a:xfrm>
           <a:prstGeom prst="rect">
@@ -4851,8 +4854,8 @@
         </p:nvSpPr>
         <p:spPr>
           <a:xfrm>
-            <a:off x="685185" y="15708791"/>
-            <a:ext cx="10387853" cy="3108543"/>
+            <a:off x="676585" y="14974573"/>
+            <a:ext cx="10387853" cy="4555093"/>
           </a:xfrm>
           <a:prstGeom prst="rect">
             <a:avLst/>
@@ -4865,7 +4868,95 @@
           </a:bodyPr>
           <a:lstStyle/>
           <a:p>
-            <a:pPr algn="just"/>
+            <a:pPr algn="just">
+              <a:spcAft>
+                <a:spcPts val="600"/>
+              </a:spcAft>
+            </a:pPr>
+            <a:r>
+              <a:rPr lang="en-US" sz="2800" dirty="0">
+                <a:solidFill>
+                  <a:schemeClr val="bg1"/>
+                </a:solidFill>
+                <a:latin typeface="Open Sans" panose="020B0606030504020204" pitchFamily="34" charset="0"/>
+                <a:ea typeface="Open Sans" panose="020B0606030504020204" pitchFamily="34" charset="0"/>
+                <a:cs typeface="Open Sans" panose="020B0606030504020204" pitchFamily="34" charset="0"/>
+              </a:rPr>
+              <a:t>To match the monthly arrivals data, we aggregated the cases from the 15th of each month to the 14th of the next, given the 2-week incubation period. This gave us </a:t>
+            </a:r>
+            <a:r>
+              <a:rPr lang="en-US" sz="2800" b="1" dirty="0">
+                <a:solidFill>
+                  <a:schemeClr val="bg1"/>
+                </a:solidFill>
+                <a:latin typeface="Open Sans" panose="020B0606030504020204" pitchFamily="34" charset="0"/>
+                <a:ea typeface="Open Sans" panose="020B0606030504020204" pitchFamily="34" charset="0"/>
+                <a:cs typeface="Open Sans" panose="020B0606030504020204" pitchFamily="34" charset="0"/>
+              </a:rPr>
+              <a:t>294 data points</a:t>
+            </a:r>
+            <a:r>
+              <a:rPr lang="en-US" sz="2800" dirty="0">
+                <a:solidFill>
+                  <a:schemeClr val="bg1"/>
+                </a:solidFill>
+                <a:latin typeface="Open Sans" panose="020B0606030504020204" pitchFamily="34" charset="0"/>
+                <a:ea typeface="Open Sans" panose="020B0606030504020204" pitchFamily="34" charset="0"/>
+                <a:cs typeface="Open Sans" panose="020B0606030504020204" pitchFamily="34" charset="0"/>
+              </a:rPr>
+              <a:t> from </a:t>
+            </a:r>
+            <a:r>
+              <a:rPr lang="en-US" sz="2800" b="1" dirty="0">
+                <a:solidFill>
+                  <a:schemeClr val="bg1"/>
+                </a:solidFill>
+                <a:latin typeface="Open Sans" panose="020B0606030504020204" pitchFamily="34" charset="0"/>
+                <a:ea typeface="Open Sans" panose="020B0606030504020204" pitchFamily="34" charset="0"/>
+                <a:cs typeface="Open Sans" panose="020B0606030504020204" pitchFamily="34" charset="0"/>
+              </a:rPr>
+              <a:t>49 states </a:t>
+            </a:r>
+            <a:r>
+              <a:rPr lang="en-US" sz="2800" dirty="0">
+                <a:solidFill>
+                  <a:schemeClr val="bg1"/>
+                </a:solidFill>
+                <a:latin typeface="Open Sans" panose="020B0606030504020204" pitchFamily="34" charset="0"/>
+                <a:ea typeface="Open Sans" panose="020B0606030504020204" pitchFamily="34" charset="0"/>
+                <a:cs typeface="Open Sans" panose="020B0606030504020204" pitchFamily="34" charset="0"/>
+              </a:rPr>
+              <a:t>(excl. DE) and </a:t>
+            </a:r>
+            <a:r>
+              <a:rPr lang="en-US" sz="2800" b="1" dirty="0">
+                <a:solidFill>
+                  <a:schemeClr val="bg1"/>
+                </a:solidFill>
+                <a:latin typeface="Open Sans" panose="020B0606030504020204" pitchFamily="34" charset="0"/>
+                <a:ea typeface="Open Sans" panose="020B0606030504020204" pitchFamily="34" charset="0"/>
+                <a:cs typeface="Open Sans" panose="020B0606030504020204" pitchFamily="34" charset="0"/>
+              </a:rPr>
+              <a:t>6 months </a:t>
+            </a:r>
+            <a:r>
+              <a:rPr lang="en-US" sz="2800" dirty="0">
+                <a:solidFill>
+                  <a:schemeClr val="bg1"/>
+                </a:solidFill>
+                <a:latin typeface="Open Sans" panose="020B0606030504020204" pitchFamily="34" charset="0"/>
+                <a:ea typeface="Open Sans" panose="020B0606030504020204" pitchFamily="34" charset="0"/>
+                <a:cs typeface="Open Sans" panose="020B0606030504020204" pitchFamily="34" charset="0"/>
+              </a:rPr>
+              <a:t>(Apr – Sep 20).</a:t>
+            </a:r>
+          </a:p>
+          <a:p>
+            <a:pPr algn="just">
+              <a:spcAft>
+                <a:spcPts val="600"/>
+              </a:spcAft>
+            </a:pPr>
             <a:r>
               <a:rPr lang="en-US" sz="2800" dirty="0">
                 <a:solidFill>
@@ -4926,7 +5017,7 @@
                 <a:ea typeface="Open Sans" panose="020B0606030504020204" pitchFamily="34" charset="0"/>
                 <a:cs typeface="Open Sans" panose="020B0606030504020204" pitchFamily="34" charset="0"/>
               </a:rPr>
-              <a:t>Both variables increased over time – possible fixed time effects</a:t>
+              <a:t>Cases increased over time – possible fixed time effects</a:t>
             </a:r>
           </a:p>
         </p:txBody>
@@ -4960,7 +5051,7 @@
         </p:blipFill>
         <p:spPr bwMode="auto">
           <a:xfrm>
-            <a:off x="685184" y="18912534"/>
+            <a:off x="676584" y="19484295"/>
             <a:ext cx="10387854" cy="4364044"/>
           </a:xfrm>
           <a:prstGeom prst="rect">
@@ -4985,8 +5076,8 @@
         </p:nvSpPr>
         <p:spPr>
           <a:xfrm>
-            <a:off x="685185" y="23344116"/>
-            <a:ext cx="10387853" cy="5339923"/>
+            <a:off x="676585" y="23862926"/>
+            <a:ext cx="10387853" cy="4909036"/>
           </a:xfrm>
           <a:prstGeom prst="rect">
             <a:avLst/>
@@ -5238,22 +5329,8 @@
                 <a:ea typeface="Open Sans" panose="020B0606030504020204" pitchFamily="34" charset="0"/>
                 <a:cs typeface="Open Sans" panose="020B0606030504020204" pitchFamily="34" charset="0"/>
               </a:rPr>
-              <a:t> – Fixed effects model</a:t>
-            </a:r>
-            <a:endParaRPr lang="en-US" sz="2800" b="1" dirty="0">
-              <a:solidFill>
-                <a:schemeClr val="bg1"/>
-              </a:solidFill>
-              <a:latin typeface="Open Sans" panose="020B0606030504020204" pitchFamily="34" charset="0"/>
-              <a:ea typeface="Open Sans" panose="020B0606030504020204" pitchFamily="34" charset="0"/>
-              <a:cs typeface="Open Sans" panose="020B0606030504020204" pitchFamily="34" charset="0"/>
-            </a:endParaRPr>
-          </a:p>
-          <a:p>
-            <a:pPr marL="457200" indent="-457200" algn="just">
-              <a:buFont typeface="Arial" panose="020B0604020202020204" pitchFamily="34" charset="0"/>
-              <a:buChar char="•"/>
-            </a:pPr>
+              <a:t> – Fixed effects model (entity &amp; time)</a:t>
+            </a:r>
             <a:endParaRPr lang="en-SG" sz="2800" b="1" dirty="0">
               <a:solidFill>
                 <a:schemeClr val="bg1"/>

</xml_diff>